<commit_message>
small change to graph slides
</commit_message>
<xml_diff>
--- a/slides/graphs-basic.pptx
+++ b/slides/graphs-basic.pptx
@@ -981,14 +981,14 @@
           <a:ln/>
           <a:extLst>
             <a:ext uri="{909E8E84-426E-40dd-AFC4-6F175D3DCCD1}">
-              <a14:hiddenFill xmlns:a14="http://schemas.microsoft.com/office/drawing/2010/main" xmlns="">
+              <a14:hiddenFill xmlns="" xmlns:a14="http://schemas.microsoft.com/office/drawing/2010/main">
                 <a:solidFill>
                   <a:srgbClr val="FFFFFF"/>
                 </a:solidFill>
               </a14:hiddenFill>
             </a:ext>
             <a:ext uri="{91240B29-F687-4f45-9708-019B960494DF}">
-              <a14:hiddenLine xmlns:a14="http://schemas.microsoft.com/office/drawing/2010/main" xmlns="" w="9525">
+              <a14:hiddenLine xmlns="" xmlns:a14="http://schemas.microsoft.com/office/drawing/2010/main" w="9525">
                 <a:solidFill>
                   <a:srgbClr val="000000"/>
                 </a:solidFill>
@@ -1024,14 +1024,14 @@
           <a:ln/>
           <a:extLst>
             <a:ext uri="{909E8E84-426E-40dd-AFC4-6F175D3DCCD1}">
-              <a14:hiddenFill xmlns:a14="http://schemas.microsoft.com/office/drawing/2010/main" xmlns="">
+              <a14:hiddenFill xmlns="" xmlns:a14="http://schemas.microsoft.com/office/drawing/2010/main">
                 <a:solidFill>
                   <a:srgbClr val="FFFFFF"/>
                 </a:solidFill>
               </a14:hiddenFill>
             </a:ext>
             <a:ext uri="{91240B29-F687-4f45-9708-019B960494DF}">
-              <a14:hiddenLine xmlns:a14="http://schemas.microsoft.com/office/drawing/2010/main" xmlns="" w="9525">
+              <a14:hiddenLine xmlns="" xmlns:a14="http://schemas.microsoft.com/office/drawing/2010/main" w="9525">
                 <a:solidFill>
                   <a:srgbClr val="000000"/>
                 </a:solidFill>
@@ -1220,14 +1220,14 @@
           <a:ln/>
           <a:extLst>
             <a:ext uri="{909E8E84-426E-40dd-AFC4-6F175D3DCCD1}">
-              <a14:hiddenFill xmlns:a14="http://schemas.microsoft.com/office/drawing/2010/main" xmlns="">
+              <a14:hiddenFill xmlns="" xmlns:a14="http://schemas.microsoft.com/office/drawing/2010/main">
                 <a:solidFill>
                   <a:srgbClr val="FFFFFF"/>
                 </a:solidFill>
               </a14:hiddenFill>
             </a:ext>
             <a:ext uri="{91240B29-F687-4f45-9708-019B960494DF}">
-              <a14:hiddenLine xmlns:a14="http://schemas.microsoft.com/office/drawing/2010/main" xmlns="" w="9525">
+              <a14:hiddenLine xmlns="" xmlns:a14="http://schemas.microsoft.com/office/drawing/2010/main" w="9525">
                 <a:solidFill>
                   <a:srgbClr val="000000"/>
                 </a:solidFill>
@@ -1263,14 +1263,14 @@
           <a:ln/>
           <a:extLst>
             <a:ext uri="{909E8E84-426E-40dd-AFC4-6F175D3DCCD1}">
-              <a14:hiddenFill xmlns:a14="http://schemas.microsoft.com/office/drawing/2010/main" xmlns="">
+              <a14:hiddenFill xmlns="" xmlns:a14="http://schemas.microsoft.com/office/drawing/2010/main">
                 <a:solidFill>
                   <a:srgbClr val="FFFFFF"/>
                 </a:solidFill>
               </a14:hiddenFill>
             </a:ext>
             <a:ext uri="{91240B29-F687-4f45-9708-019B960494DF}">
-              <a14:hiddenLine xmlns:a14="http://schemas.microsoft.com/office/drawing/2010/main" xmlns="" w="9525">
+              <a14:hiddenLine xmlns="" xmlns:a14="http://schemas.microsoft.com/office/drawing/2010/main" w="9525">
                 <a:solidFill>
                   <a:srgbClr val="000000"/>
                 </a:solidFill>
@@ -1459,14 +1459,14 @@
           <a:ln/>
           <a:extLst>
             <a:ext uri="{909E8E84-426E-40dd-AFC4-6F175D3DCCD1}">
-              <a14:hiddenFill xmlns:a14="http://schemas.microsoft.com/office/drawing/2010/main" xmlns="">
+              <a14:hiddenFill xmlns="" xmlns:a14="http://schemas.microsoft.com/office/drawing/2010/main">
                 <a:solidFill>
                   <a:srgbClr val="FFFFFF"/>
                 </a:solidFill>
               </a14:hiddenFill>
             </a:ext>
             <a:ext uri="{91240B29-F687-4f45-9708-019B960494DF}">
-              <a14:hiddenLine xmlns:a14="http://schemas.microsoft.com/office/drawing/2010/main" xmlns="" w="9525">
+              <a14:hiddenLine xmlns="" xmlns:a14="http://schemas.microsoft.com/office/drawing/2010/main" w="9525">
                 <a:solidFill>
                   <a:srgbClr val="000000"/>
                 </a:solidFill>
@@ -1502,14 +1502,14 @@
           <a:ln/>
           <a:extLst>
             <a:ext uri="{909E8E84-426E-40dd-AFC4-6F175D3DCCD1}">
-              <a14:hiddenFill xmlns:a14="http://schemas.microsoft.com/office/drawing/2010/main" xmlns="">
+              <a14:hiddenFill xmlns="" xmlns:a14="http://schemas.microsoft.com/office/drawing/2010/main">
                 <a:solidFill>
                   <a:srgbClr val="FFFFFF"/>
                 </a:solidFill>
               </a14:hiddenFill>
             </a:ext>
             <a:ext uri="{91240B29-F687-4f45-9708-019B960494DF}">
-              <a14:hiddenLine xmlns:a14="http://schemas.microsoft.com/office/drawing/2010/main" xmlns="" w="9525">
+              <a14:hiddenLine xmlns="" xmlns:a14="http://schemas.microsoft.com/office/drawing/2010/main" w="9525">
                 <a:solidFill>
                   <a:srgbClr val="000000"/>
                 </a:solidFill>
@@ -1698,14 +1698,14 @@
           <a:ln/>
           <a:extLst>
             <a:ext uri="{909E8E84-426E-40dd-AFC4-6F175D3DCCD1}">
-              <a14:hiddenFill xmlns:a14="http://schemas.microsoft.com/office/drawing/2010/main" xmlns="">
+              <a14:hiddenFill xmlns="" xmlns:a14="http://schemas.microsoft.com/office/drawing/2010/main">
                 <a:solidFill>
                   <a:srgbClr val="FFFFFF"/>
                 </a:solidFill>
               </a14:hiddenFill>
             </a:ext>
             <a:ext uri="{91240B29-F687-4f45-9708-019B960494DF}">
-              <a14:hiddenLine xmlns:a14="http://schemas.microsoft.com/office/drawing/2010/main" xmlns="" w="9525">
+              <a14:hiddenLine xmlns="" xmlns:a14="http://schemas.microsoft.com/office/drawing/2010/main" w="9525">
                 <a:solidFill>
                   <a:srgbClr val="000000"/>
                 </a:solidFill>
@@ -1741,14 +1741,14 @@
           <a:ln/>
           <a:extLst>
             <a:ext uri="{909E8E84-426E-40dd-AFC4-6F175D3DCCD1}">
-              <a14:hiddenFill xmlns:a14="http://schemas.microsoft.com/office/drawing/2010/main" xmlns="">
+              <a14:hiddenFill xmlns="" xmlns:a14="http://schemas.microsoft.com/office/drawing/2010/main">
                 <a:solidFill>
                   <a:srgbClr val="FFFFFF"/>
                 </a:solidFill>
               </a14:hiddenFill>
             </a:ext>
             <a:ext uri="{91240B29-F687-4f45-9708-019B960494DF}">
-              <a14:hiddenLine xmlns:a14="http://schemas.microsoft.com/office/drawing/2010/main" xmlns="" w="9525">
+              <a14:hiddenLine xmlns="" xmlns:a14="http://schemas.microsoft.com/office/drawing/2010/main" w="9525">
                 <a:solidFill>
                   <a:srgbClr val="000000"/>
                 </a:solidFill>
@@ -1937,14 +1937,14 @@
           <a:ln/>
           <a:extLst>
             <a:ext uri="{909E8E84-426E-40dd-AFC4-6F175D3DCCD1}">
-              <a14:hiddenFill xmlns:a14="http://schemas.microsoft.com/office/drawing/2010/main" xmlns="">
+              <a14:hiddenFill xmlns="" xmlns:a14="http://schemas.microsoft.com/office/drawing/2010/main">
                 <a:solidFill>
                   <a:srgbClr val="FFFFFF"/>
                 </a:solidFill>
               </a14:hiddenFill>
             </a:ext>
             <a:ext uri="{91240B29-F687-4f45-9708-019B960494DF}">
-              <a14:hiddenLine xmlns:a14="http://schemas.microsoft.com/office/drawing/2010/main" xmlns="" w="9525">
+              <a14:hiddenLine xmlns="" xmlns:a14="http://schemas.microsoft.com/office/drawing/2010/main" w="9525">
                 <a:solidFill>
                   <a:srgbClr val="000000"/>
                 </a:solidFill>
@@ -1980,14 +1980,14 @@
           <a:ln/>
           <a:extLst>
             <a:ext uri="{909E8E84-426E-40dd-AFC4-6F175D3DCCD1}">
-              <a14:hiddenFill xmlns:a14="http://schemas.microsoft.com/office/drawing/2010/main" xmlns="">
+              <a14:hiddenFill xmlns="" xmlns:a14="http://schemas.microsoft.com/office/drawing/2010/main">
                 <a:solidFill>
                   <a:srgbClr val="FFFFFF"/>
                 </a:solidFill>
               </a14:hiddenFill>
             </a:ext>
             <a:ext uri="{91240B29-F687-4f45-9708-019B960494DF}">
-              <a14:hiddenLine xmlns:a14="http://schemas.microsoft.com/office/drawing/2010/main" xmlns="" w="9525">
+              <a14:hiddenLine xmlns="" xmlns:a14="http://schemas.microsoft.com/office/drawing/2010/main" w="9525">
                 <a:solidFill>
                   <a:srgbClr val="000000"/>
                 </a:solidFill>
@@ -2176,14 +2176,14 @@
           <a:ln/>
           <a:extLst>
             <a:ext uri="{909E8E84-426E-40dd-AFC4-6F175D3DCCD1}">
-              <a14:hiddenFill xmlns:a14="http://schemas.microsoft.com/office/drawing/2010/main" xmlns="">
+              <a14:hiddenFill xmlns="" xmlns:a14="http://schemas.microsoft.com/office/drawing/2010/main">
                 <a:solidFill>
                   <a:srgbClr val="FFFFFF"/>
                 </a:solidFill>
               </a14:hiddenFill>
             </a:ext>
             <a:ext uri="{91240B29-F687-4f45-9708-019B960494DF}">
-              <a14:hiddenLine xmlns:a14="http://schemas.microsoft.com/office/drawing/2010/main" xmlns="" w="9525">
+              <a14:hiddenLine xmlns="" xmlns:a14="http://schemas.microsoft.com/office/drawing/2010/main" w="9525">
                 <a:solidFill>
                   <a:srgbClr val="000000"/>
                 </a:solidFill>
@@ -2219,14 +2219,14 @@
           <a:ln/>
           <a:extLst>
             <a:ext uri="{909E8E84-426E-40dd-AFC4-6F175D3DCCD1}">
-              <a14:hiddenFill xmlns:a14="http://schemas.microsoft.com/office/drawing/2010/main" xmlns="">
+              <a14:hiddenFill xmlns="" xmlns:a14="http://schemas.microsoft.com/office/drawing/2010/main">
                 <a:solidFill>
                   <a:srgbClr val="FFFFFF"/>
                 </a:solidFill>
               </a14:hiddenFill>
             </a:ext>
             <a:ext uri="{91240B29-F687-4f45-9708-019B960494DF}">
-              <a14:hiddenLine xmlns:a14="http://schemas.microsoft.com/office/drawing/2010/main" xmlns="" w="9525">
+              <a14:hiddenLine xmlns="" xmlns:a14="http://schemas.microsoft.com/office/drawing/2010/main" w="9525">
                 <a:solidFill>
                   <a:srgbClr val="000000"/>
                 </a:solidFill>
@@ -2520,14 +2520,14 @@
           <a:ln/>
           <a:extLst>
             <a:ext uri="{909E8E84-426E-40dd-AFC4-6F175D3DCCD1}">
-              <a14:hiddenFill xmlns:a14="http://schemas.microsoft.com/office/drawing/2010/main" xmlns="">
+              <a14:hiddenFill xmlns="" xmlns:a14="http://schemas.microsoft.com/office/drawing/2010/main">
                 <a:solidFill>
                   <a:srgbClr val="FFFFFF"/>
                 </a:solidFill>
               </a14:hiddenFill>
             </a:ext>
             <a:ext uri="{91240B29-F687-4f45-9708-019B960494DF}">
-              <a14:hiddenLine xmlns:a14="http://schemas.microsoft.com/office/drawing/2010/main" xmlns="" w="9525">
+              <a14:hiddenLine xmlns="" xmlns:a14="http://schemas.microsoft.com/office/drawing/2010/main" w="9525">
                 <a:solidFill>
                   <a:srgbClr val="000000"/>
                 </a:solidFill>
@@ -2563,14 +2563,14 @@
           <a:ln/>
           <a:extLst>
             <a:ext uri="{909E8E84-426E-40dd-AFC4-6F175D3DCCD1}">
-              <a14:hiddenFill xmlns:a14="http://schemas.microsoft.com/office/drawing/2010/main" xmlns="">
+              <a14:hiddenFill xmlns="" xmlns:a14="http://schemas.microsoft.com/office/drawing/2010/main">
                 <a:solidFill>
                   <a:srgbClr val="FFFFFF"/>
                 </a:solidFill>
               </a14:hiddenFill>
             </a:ext>
             <a:ext uri="{91240B29-F687-4f45-9708-019B960494DF}">
-              <a14:hiddenLine xmlns:a14="http://schemas.microsoft.com/office/drawing/2010/main" xmlns="" w="9525">
+              <a14:hiddenLine xmlns="" xmlns:a14="http://schemas.microsoft.com/office/drawing/2010/main" w="9525">
                 <a:solidFill>
                   <a:srgbClr val="000000"/>
                 </a:solidFill>
@@ -2759,14 +2759,14 @@
           <a:ln/>
           <a:extLst>
             <a:ext uri="{909E8E84-426E-40dd-AFC4-6F175D3DCCD1}">
-              <a14:hiddenFill xmlns:a14="http://schemas.microsoft.com/office/drawing/2010/main" xmlns="">
+              <a14:hiddenFill xmlns="" xmlns:a14="http://schemas.microsoft.com/office/drawing/2010/main">
                 <a:solidFill>
                   <a:srgbClr val="FFFFFF"/>
                 </a:solidFill>
               </a14:hiddenFill>
             </a:ext>
             <a:ext uri="{91240B29-F687-4f45-9708-019B960494DF}">
-              <a14:hiddenLine xmlns:a14="http://schemas.microsoft.com/office/drawing/2010/main" xmlns="" w="9525">
+              <a14:hiddenLine xmlns="" xmlns:a14="http://schemas.microsoft.com/office/drawing/2010/main" w="9525">
                 <a:solidFill>
                   <a:srgbClr val="000000"/>
                 </a:solidFill>
@@ -2802,14 +2802,14 @@
           <a:ln/>
           <a:extLst>
             <a:ext uri="{909E8E84-426E-40dd-AFC4-6F175D3DCCD1}">
-              <a14:hiddenFill xmlns:a14="http://schemas.microsoft.com/office/drawing/2010/main" xmlns="">
+              <a14:hiddenFill xmlns="" xmlns:a14="http://schemas.microsoft.com/office/drawing/2010/main">
                 <a:solidFill>
                   <a:srgbClr val="FFFFFF"/>
                 </a:solidFill>
               </a14:hiddenFill>
             </a:ext>
             <a:ext uri="{91240B29-F687-4f45-9708-019B960494DF}">
-              <a14:hiddenLine xmlns:a14="http://schemas.microsoft.com/office/drawing/2010/main" xmlns="" w="9525">
+              <a14:hiddenLine xmlns="" xmlns:a14="http://schemas.microsoft.com/office/drawing/2010/main" w="9525">
                 <a:solidFill>
                   <a:srgbClr val="000000"/>
                 </a:solidFill>
@@ -2998,14 +2998,14 @@
           <a:ln/>
           <a:extLst>
             <a:ext uri="{909E8E84-426E-40dd-AFC4-6F175D3DCCD1}">
-              <a14:hiddenFill xmlns:a14="http://schemas.microsoft.com/office/drawing/2010/main" xmlns="">
+              <a14:hiddenFill xmlns="" xmlns:a14="http://schemas.microsoft.com/office/drawing/2010/main">
                 <a:solidFill>
                   <a:srgbClr val="FFFFFF"/>
                 </a:solidFill>
               </a14:hiddenFill>
             </a:ext>
             <a:ext uri="{91240B29-F687-4f45-9708-019B960494DF}">
-              <a14:hiddenLine xmlns:a14="http://schemas.microsoft.com/office/drawing/2010/main" xmlns="" w="9525">
+              <a14:hiddenLine xmlns="" xmlns:a14="http://schemas.microsoft.com/office/drawing/2010/main" w="9525">
                 <a:solidFill>
                   <a:srgbClr val="000000"/>
                 </a:solidFill>
@@ -3041,14 +3041,14 @@
           <a:ln/>
           <a:extLst>
             <a:ext uri="{909E8E84-426E-40dd-AFC4-6F175D3DCCD1}">
-              <a14:hiddenFill xmlns:a14="http://schemas.microsoft.com/office/drawing/2010/main" xmlns="">
+              <a14:hiddenFill xmlns="" xmlns:a14="http://schemas.microsoft.com/office/drawing/2010/main">
                 <a:solidFill>
                   <a:srgbClr val="FFFFFF"/>
                 </a:solidFill>
               </a14:hiddenFill>
             </a:ext>
             <a:ext uri="{91240B29-F687-4f45-9708-019B960494DF}">
-              <a14:hiddenLine xmlns:a14="http://schemas.microsoft.com/office/drawing/2010/main" xmlns="" w="9525">
+              <a14:hiddenLine xmlns="" xmlns:a14="http://schemas.microsoft.com/office/drawing/2010/main" w="9525">
                 <a:solidFill>
                   <a:srgbClr val="000000"/>
                 </a:solidFill>
@@ -3237,14 +3237,14 @@
           <a:ln/>
           <a:extLst>
             <a:ext uri="{909E8E84-426E-40dd-AFC4-6F175D3DCCD1}">
-              <a14:hiddenFill xmlns:a14="http://schemas.microsoft.com/office/drawing/2010/main" xmlns="">
+              <a14:hiddenFill xmlns="" xmlns:a14="http://schemas.microsoft.com/office/drawing/2010/main">
                 <a:solidFill>
                   <a:srgbClr val="FFFFFF"/>
                 </a:solidFill>
               </a14:hiddenFill>
             </a:ext>
             <a:ext uri="{91240B29-F687-4f45-9708-019B960494DF}">
-              <a14:hiddenLine xmlns:a14="http://schemas.microsoft.com/office/drawing/2010/main" xmlns="" w="9525">
+              <a14:hiddenLine xmlns="" xmlns:a14="http://schemas.microsoft.com/office/drawing/2010/main" w="9525">
                 <a:solidFill>
                   <a:srgbClr val="000000"/>
                 </a:solidFill>
@@ -3280,14 +3280,14 @@
           <a:ln/>
           <a:extLst>
             <a:ext uri="{909E8E84-426E-40dd-AFC4-6F175D3DCCD1}">
-              <a14:hiddenFill xmlns:a14="http://schemas.microsoft.com/office/drawing/2010/main" xmlns="">
+              <a14:hiddenFill xmlns="" xmlns:a14="http://schemas.microsoft.com/office/drawing/2010/main">
                 <a:solidFill>
                   <a:srgbClr val="FFFFFF"/>
                 </a:solidFill>
               </a14:hiddenFill>
             </a:ext>
             <a:ext uri="{91240B29-F687-4f45-9708-019B960494DF}">
-              <a14:hiddenLine xmlns:a14="http://schemas.microsoft.com/office/drawing/2010/main" xmlns="" w="9525">
+              <a14:hiddenLine xmlns="" xmlns:a14="http://schemas.microsoft.com/office/drawing/2010/main" w="9525">
                 <a:solidFill>
                   <a:srgbClr val="000000"/>
                 </a:solidFill>
@@ -3476,14 +3476,14 @@
           <a:ln/>
           <a:extLst>
             <a:ext uri="{909E8E84-426E-40dd-AFC4-6F175D3DCCD1}">
-              <a14:hiddenFill xmlns:a14="http://schemas.microsoft.com/office/drawing/2010/main" xmlns="">
+              <a14:hiddenFill xmlns="" xmlns:a14="http://schemas.microsoft.com/office/drawing/2010/main">
                 <a:solidFill>
                   <a:srgbClr val="FFFFFF"/>
                 </a:solidFill>
               </a14:hiddenFill>
             </a:ext>
             <a:ext uri="{91240B29-F687-4f45-9708-019B960494DF}">
-              <a14:hiddenLine xmlns:a14="http://schemas.microsoft.com/office/drawing/2010/main" xmlns="" w="9525">
+              <a14:hiddenLine xmlns="" xmlns:a14="http://schemas.microsoft.com/office/drawing/2010/main" w="9525">
                 <a:solidFill>
                   <a:srgbClr val="000000"/>
                 </a:solidFill>
@@ -3519,14 +3519,14 @@
           <a:ln/>
           <a:extLst>
             <a:ext uri="{909E8E84-426E-40dd-AFC4-6F175D3DCCD1}">
-              <a14:hiddenFill xmlns:a14="http://schemas.microsoft.com/office/drawing/2010/main" xmlns="">
+              <a14:hiddenFill xmlns="" xmlns:a14="http://schemas.microsoft.com/office/drawing/2010/main">
                 <a:solidFill>
                   <a:srgbClr val="FFFFFF"/>
                 </a:solidFill>
               </a14:hiddenFill>
             </a:ext>
             <a:ext uri="{91240B29-F687-4f45-9708-019B960494DF}">
-              <a14:hiddenLine xmlns:a14="http://schemas.microsoft.com/office/drawing/2010/main" xmlns="" w="9525">
+              <a14:hiddenLine xmlns="" xmlns:a14="http://schemas.microsoft.com/office/drawing/2010/main" w="9525">
                 <a:solidFill>
                   <a:srgbClr val="000000"/>
                 </a:solidFill>
@@ -3715,14 +3715,14 @@
           <a:ln/>
           <a:extLst>
             <a:ext uri="{909E8E84-426E-40dd-AFC4-6F175D3DCCD1}">
-              <a14:hiddenFill xmlns:a14="http://schemas.microsoft.com/office/drawing/2010/main" xmlns="">
+              <a14:hiddenFill xmlns="" xmlns:a14="http://schemas.microsoft.com/office/drawing/2010/main">
                 <a:solidFill>
                   <a:srgbClr val="FFFFFF"/>
                 </a:solidFill>
               </a14:hiddenFill>
             </a:ext>
             <a:ext uri="{91240B29-F687-4f45-9708-019B960494DF}">
-              <a14:hiddenLine xmlns:a14="http://schemas.microsoft.com/office/drawing/2010/main" xmlns="" w="9525">
+              <a14:hiddenLine xmlns="" xmlns:a14="http://schemas.microsoft.com/office/drawing/2010/main" w="9525">
                 <a:solidFill>
                   <a:srgbClr val="000000"/>
                 </a:solidFill>
@@ -3758,14 +3758,14 @@
           <a:ln/>
           <a:extLst>
             <a:ext uri="{909E8E84-426E-40dd-AFC4-6F175D3DCCD1}">
-              <a14:hiddenFill xmlns:a14="http://schemas.microsoft.com/office/drawing/2010/main" xmlns="">
+              <a14:hiddenFill xmlns="" xmlns:a14="http://schemas.microsoft.com/office/drawing/2010/main">
                 <a:solidFill>
                   <a:srgbClr val="FFFFFF"/>
                 </a:solidFill>
               </a14:hiddenFill>
             </a:ext>
             <a:ext uri="{91240B29-F687-4f45-9708-019B960494DF}">
-              <a14:hiddenLine xmlns:a14="http://schemas.microsoft.com/office/drawing/2010/main" xmlns="" w="9525">
+              <a14:hiddenLine xmlns="" xmlns:a14="http://schemas.microsoft.com/office/drawing/2010/main" w="9525">
                 <a:solidFill>
                   <a:srgbClr val="000000"/>
                 </a:solidFill>
@@ -3954,14 +3954,14 @@
           <a:ln/>
           <a:extLst>
             <a:ext uri="{909E8E84-426E-40dd-AFC4-6F175D3DCCD1}">
-              <a14:hiddenFill xmlns:a14="http://schemas.microsoft.com/office/drawing/2010/main" xmlns="">
+              <a14:hiddenFill xmlns="" xmlns:a14="http://schemas.microsoft.com/office/drawing/2010/main">
                 <a:solidFill>
                   <a:srgbClr val="FFFFFF"/>
                 </a:solidFill>
               </a14:hiddenFill>
             </a:ext>
             <a:ext uri="{91240B29-F687-4f45-9708-019B960494DF}">
-              <a14:hiddenLine xmlns:a14="http://schemas.microsoft.com/office/drawing/2010/main" xmlns="" w="9525">
+              <a14:hiddenLine xmlns="" xmlns:a14="http://schemas.microsoft.com/office/drawing/2010/main" w="9525">
                 <a:solidFill>
                   <a:srgbClr val="000000"/>
                 </a:solidFill>
@@ -3997,14 +3997,14 @@
           <a:ln/>
           <a:extLst>
             <a:ext uri="{909E8E84-426E-40dd-AFC4-6F175D3DCCD1}">
-              <a14:hiddenFill xmlns:a14="http://schemas.microsoft.com/office/drawing/2010/main" xmlns="">
+              <a14:hiddenFill xmlns="" xmlns:a14="http://schemas.microsoft.com/office/drawing/2010/main">
                 <a:solidFill>
                   <a:srgbClr val="FFFFFF"/>
                 </a:solidFill>
               </a14:hiddenFill>
             </a:ext>
             <a:ext uri="{91240B29-F687-4f45-9708-019B960494DF}">
-              <a14:hiddenLine xmlns:a14="http://schemas.microsoft.com/office/drawing/2010/main" xmlns="" w="9525">
+              <a14:hiddenLine xmlns="" xmlns:a14="http://schemas.microsoft.com/office/drawing/2010/main" w="9525">
                 <a:solidFill>
                   <a:srgbClr val="000000"/>
                 </a:solidFill>
@@ -4193,14 +4193,14 @@
           <a:ln/>
           <a:extLst>
             <a:ext uri="{909E8E84-426E-40dd-AFC4-6F175D3DCCD1}">
-              <a14:hiddenFill xmlns:a14="http://schemas.microsoft.com/office/drawing/2010/main" xmlns="">
+              <a14:hiddenFill xmlns="" xmlns:a14="http://schemas.microsoft.com/office/drawing/2010/main">
                 <a:solidFill>
                   <a:srgbClr val="FFFFFF"/>
                 </a:solidFill>
               </a14:hiddenFill>
             </a:ext>
             <a:ext uri="{91240B29-F687-4f45-9708-019B960494DF}">
-              <a14:hiddenLine xmlns:a14="http://schemas.microsoft.com/office/drawing/2010/main" xmlns="" w="9525">
+              <a14:hiddenLine xmlns="" xmlns:a14="http://schemas.microsoft.com/office/drawing/2010/main" w="9525">
                 <a:solidFill>
                   <a:srgbClr val="000000"/>
                 </a:solidFill>
@@ -4236,14 +4236,14 @@
           <a:ln/>
           <a:extLst>
             <a:ext uri="{909E8E84-426E-40dd-AFC4-6F175D3DCCD1}">
-              <a14:hiddenFill xmlns:a14="http://schemas.microsoft.com/office/drawing/2010/main" xmlns="">
+              <a14:hiddenFill xmlns="" xmlns:a14="http://schemas.microsoft.com/office/drawing/2010/main">
                 <a:solidFill>
                   <a:srgbClr val="FFFFFF"/>
                 </a:solidFill>
               </a14:hiddenFill>
             </a:ext>
             <a:ext uri="{91240B29-F687-4f45-9708-019B960494DF}">
-              <a14:hiddenLine xmlns:a14="http://schemas.microsoft.com/office/drawing/2010/main" xmlns="" w="9525">
+              <a14:hiddenLine xmlns="" xmlns:a14="http://schemas.microsoft.com/office/drawing/2010/main" w="9525">
                 <a:solidFill>
                   <a:srgbClr val="000000"/>
                 </a:solidFill>
@@ -15052,14 +15052,14 @@
           </a:ln>
           <a:extLst>
             <a:ext uri="{909E8E84-426E-40dd-AFC4-6F175D3DCCD1}">
-              <a14:hiddenFill xmlns:a14="http://schemas.microsoft.com/office/drawing/2010/main" xmlns="">
+              <a14:hiddenFill xmlns="" xmlns:a14="http://schemas.microsoft.com/office/drawing/2010/main">
                 <a:solidFill>
                   <a:srgbClr val="FFFFFF"/>
                 </a:solidFill>
               </a14:hiddenFill>
             </a:ext>
             <a:ext uri="{91240B29-F687-4f45-9708-019B960494DF}">
-              <a14:hiddenLine xmlns:a14="http://schemas.microsoft.com/office/drawing/2010/main" xmlns="" w="9525">
+              <a14:hiddenLine xmlns="" xmlns:a14="http://schemas.microsoft.com/office/drawing/2010/main" w="9525">
                 <a:solidFill>
                   <a:srgbClr val="000000"/>
                 </a:solidFill>
@@ -15106,14 +15106,14 @@
           </a:ln>
           <a:extLst>
             <a:ext uri="{909E8E84-426E-40dd-AFC4-6F175D3DCCD1}">
-              <a14:hiddenFill xmlns:a14="http://schemas.microsoft.com/office/drawing/2010/main" xmlns="">
+              <a14:hiddenFill xmlns="" xmlns:a14="http://schemas.microsoft.com/office/drawing/2010/main">
                 <a:solidFill>
                   <a:srgbClr val="FFFFFF"/>
                 </a:solidFill>
               </a14:hiddenFill>
             </a:ext>
             <a:ext uri="{91240B29-F687-4f45-9708-019B960494DF}">
-              <a14:hiddenLine xmlns:a14="http://schemas.microsoft.com/office/drawing/2010/main" xmlns="" w="9525">
+              <a14:hiddenLine xmlns="" xmlns:a14="http://schemas.microsoft.com/office/drawing/2010/main" w="9525">
                 <a:solidFill>
                   <a:srgbClr val="000000"/>
                 </a:solidFill>
@@ -15147,14 +15147,14 @@
           </a:ln>
           <a:extLst>
             <a:ext uri="{909E8E84-426E-40dd-AFC4-6F175D3DCCD1}">
-              <a14:hiddenFill xmlns:a14="http://schemas.microsoft.com/office/drawing/2010/main" xmlns="">
+              <a14:hiddenFill xmlns="" xmlns:a14="http://schemas.microsoft.com/office/drawing/2010/main">
                 <a:solidFill>
                   <a:srgbClr val="FFFFFF"/>
                 </a:solidFill>
               </a14:hiddenFill>
             </a:ext>
             <a:ext uri="{91240B29-F687-4f45-9708-019B960494DF}">
-              <a14:hiddenLine xmlns:a14="http://schemas.microsoft.com/office/drawing/2010/main" xmlns="" w="9525">
+              <a14:hiddenLine xmlns="" xmlns:a14="http://schemas.microsoft.com/office/drawing/2010/main" w="9525">
                 <a:solidFill>
                   <a:srgbClr val="000000"/>
                 </a:solidFill>
@@ -15308,14 +15308,14 @@
           </a:ln>
           <a:extLst>
             <a:ext uri="{909E8E84-426E-40dd-AFC4-6F175D3DCCD1}">
-              <a14:hiddenFill xmlns:a14="http://schemas.microsoft.com/office/drawing/2010/main" xmlns="">
+              <a14:hiddenFill xmlns="" xmlns:a14="http://schemas.microsoft.com/office/drawing/2010/main">
                 <a:solidFill>
                   <a:srgbClr val="FFFFFF"/>
                 </a:solidFill>
               </a14:hiddenFill>
             </a:ext>
             <a:ext uri="{91240B29-F687-4f45-9708-019B960494DF}">
-              <a14:hiddenLine xmlns:a14="http://schemas.microsoft.com/office/drawing/2010/main" xmlns="" w="9525">
+              <a14:hiddenLine xmlns="" xmlns:a14="http://schemas.microsoft.com/office/drawing/2010/main" w="9525">
                 <a:solidFill>
                   <a:srgbClr val="000000"/>
                 </a:solidFill>
@@ -15597,14 +15597,14 @@
           </a:ln>
           <a:extLst>
             <a:ext uri="{909E8E84-426E-40dd-AFC4-6F175D3DCCD1}">
-              <a14:hiddenFill xmlns:a14="http://schemas.microsoft.com/office/drawing/2010/main" xmlns="">
+              <a14:hiddenFill xmlns="" xmlns:a14="http://schemas.microsoft.com/office/drawing/2010/main">
                 <a:solidFill>
                   <a:srgbClr val="FFFFFF"/>
                 </a:solidFill>
               </a14:hiddenFill>
             </a:ext>
             <a:ext uri="{91240B29-F687-4f45-9708-019B960494DF}">
-              <a14:hiddenLine xmlns:a14="http://schemas.microsoft.com/office/drawing/2010/main" xmlns="" w="9525">
+              <a14:hiddenLine xmlns="" xmlns:a14="http://schemas.microsoft.com/office/drawing/2010/main" w="9525">
                 <a:solidFill>
                   <a:srgbClr val="000000"/>
                 </a:solidFill>
@@ -15681,14 +15681,14 @@
           </a:ln>
           <a:extLst>
             <a:ext uri="{909E8E84-426E-40dd-AFC4-6F175D3DCCD1}">
-              <a14:hiddenFill xmlns:a14="http://schemas.microsoft.com/office/drawing/2010/main" xmlns="">
+              <a14:hiddenFill xmlns="" xmlns:a14="http://schemas.microsoft.com/office/drawing/2010/main">
                 <a:solidFill>
                   <a:srgbClr val="FFFFFF"/>
                 </a:solidFill>
               </a14:hiddenFill>
             </a:ext>
             <a:ext uri="{91240B29-F687-4f45-9708-019B960494DF}">
-              <a14:hiddenLine xmlns:a14="http://schemas.microsoft.com/office/drawing/2010/main" xmlns="" w="9525">
+              <a14:hiddenLine xmlns="" xmlns:a14="http://schemas.microsoft.com/office/drawing/2010/main" w="9525">
                 <a:solidFill>
                   <a:srgbClr val="000000"/>
                 </a:solidFill>
@@ -15722,14 +15722,14 @@
           </a:ln>
           <a:extLst>
             <a:ext uri="{909E8E84-426E-40dd-AFC4-6F175D3DCCD1}">
-              <a14:hiddenFill xmlns:a14="http://schemas.microsoft.com/office/drawing/2010/main" xmlns="">
+              <a14:hiddenFill xmlns="" xmlns:a14="http://schemas.microsoft.com/office/drawing/2010/main">
                 <a:solidFill>
                   <a:srgbClr val="FFFFFF"/>
                 </a:solidFill>
               </a14:hiddenFill>
             </a:ext>
             <a:ext uri="{91240B29-F687-4f45-9708-019B960494DF}">
-              <a14:hiddenLine xmlns:a14="http://schemas.microsoft.com/office/drawing/2010/main" xmlns="" w="9525">
+              <a14:hiddenLine xmlns="" xmlns:a14="http://schemas.microsoft.com/office/drawing/2010/main" w="9525">
                 <a:solidFill>
                   <a:srgbClr val="000000"/>
                 </a:solidFill>
@@ -15927,14 +15927,14 @@
           </a:ln>
           <a:extLst>
             <a:ext uri="{909E8E84-426E-40dd-AFC4-6F175D3DCCD1}">
-              <a14:hiddenFill xmlns:a14="http://schemas.microsoft.com/office/drawing/2010/main" xmlns="">
+              <a14:hiddenFill xmlns="" xmlns:a14="http://schemas.microsoft.com/office/drawing/2010/main">
                 <a:solidFill>
                   <a:srgbClr val="FFFFFF"/>
                 </a:solidFill>
               </a14:hiddenFill>
             </a:ext>
             <a:ext uri="{91240B29-F687-4f45-9708-019B960494DF}">
-              <a14:hiddenLine xmlns:a14="http://schemas.microsoft.com/office/drawing/2010/main" xmlns="" w="9525">
+              <a14:hiddenLine xmlns="" xmlns:a14="http://schemas.microsoft.com/office/drawing/2010/main" w="9525">
                 <a:solidFill>
                   <a:srgbClr val="000000"/>
                 </a:solidFill>
@@ -16169,14 +16169,14 @@
           </a:ln>
           <a:extLst>
             <a:ext uri="{909E8E84-426E-40dd-AFC4-6F175D3DCCD1}">
-              <a14:hiddenFill xmlns:a14="http://schemas.microsoft.com/office/drawing/2010/main" xmlns="">
+              <a14:hiddenFill xmlns="" xmlns:a14="http://schemas.microsoft.com/office/drawing/2010/main">
                 <a:solidFill>
                   <a:srgbClr val="FFFFFF"/>
                 </a:solidFill>
               </a14:hiddenFill>
             </a:ext>
             <a:ext uri="{91240B29-F687-4f45-9708-019B960494DF}">
-              <a14:hiddenLine xmlns:a14="http://schemas.microsoft.com/office/drawing/2010/main" xmlns="" w="9525">
+              <a14:hiddenLine xmlns="" xmlns:a14="http://schemas.microsoft.com/office/drawing/2010/main" w="9525">
                 <a:solidFill>
                   <a:srgbClr val="000000"/>
                 </a:solidFill>
@@ -16210,14 +16210,14 @@
           </a:ln>
           <a:extLst>
             <a:ext uri="{909E8E84-426E-40dd-AFC4-6F175D3DCCD1}">
-              <a14:hiddenFill xmlns:a14="http://schemas.microsoft.com/office/drawing/2010/main" xmlns="">
+              <a14:hiddenFill xmlns="" xmlns:a14="http://schemas.microsoft.com/office/drawing/2010/main">
                 <a:solidFill>
                   <a:srgbClr val="FFFFFF"/>
                 </a:solidFill>
               </a14:hiddenFill>
             </a:ext>
             <a:ext uri="{91240B29-F687-4f45-9708-019B960494DF}">
-              <a14:hiddenLine xmlns:a14="http://schemas.microsoft.com/office/drawing/2010/main" xmlns="" w="9525">
+              <a14:hiddenLine xmlns="" xmlns:a14="http://schemas.microsoft.com/office/drawing/2010/main" w="9525">
                 <a:solidFill>
                   <a:srgbClr val="000000"/>
                 </a:solidFill>
@@ -16809,14 +16809,14 @@
           </a:ln>
           <a:extLst>
             <a:ext uri="{909E8E84-426E-40dd-AFC4-6F175D3DCCD1}">
-              <a14:hiddenFill xmlns:a14="http://schemas.microsoft.com/office/drawing/2010/main" xmlns="">
+              <a14:hiddenFill xmlns="" xmlns:a14="http://schemas.microsoft.com/office/drawing/2010/main">
                 <a:solidFill>
                   <a:srgbClr val="FFFFFF"/>
                 </a:solidFill>
               </a14:hiddenFill>
             </a:ext>
             <a:ext uri="{91240B29-F687-4f45-9708-019B960494DF}">
-              <a14:hiddenLine xmlns:a14="http://schemas.microsoft.com/office/drawing/2010/main" xmlns="" w="9525">
+              <a14:hiddenLine xmlns="" xmlns:a14="http://schemas.microsoft.com/office/drawing/2010/main" w="9525">
                 <a:solidFill>
                   <a:srgbClr val="000000"/>
                 </a:solidFill>
@@ -26831,8 +26831,8 @@
           <a:lstStyle/>
           <a:p>
             <a:r>
-              <a:rPr lang="en-US"/>
-              <a:t>Correctness of These Greedy Algorithms</a:t>
+              <a:rPr lang="en-US" dirty="0"/>
+              <a:t>Correctness of These Algorithms</a:t>
             </a:r>
           </a:p>
         </p:txBody>

</xml_diff>